<commit_message>
no queda casi nada!
</commit_message>
<xml_diff>
--- a/Sprint 10 - Pràctica final/Presentación - Enfermedades raras.pptx
+++ b/Sprint 10 - Pràctica final/Presentación - Enfermedades raras.pptx
@@ -4118,6 +4118,129 @@
 </p:notesMaster>
 </file>
 
+<file path=ppt/notesSlides/notesSlide1.xml><?xml version="1.0" encoding="utf-8"?>
+<p:notes xmlns:a="http://schemas.openxmlformats.org/drawingml/2006/main" xmlns:r="http://schemas.openxmlformats.org/officeDocument/2006/relationships" xmlns:p="http://schemas.openxmlformats.org/presentationml/2006/main">
+  <p:cSld>
+    <p:spTree>
+      <p:nvGrpSpPr>
+        <p:cNvPr id="1" name=""/>
+        <p:cNvGrpSpPr/>
+        <p:nvPr/>
+      </p:nvGrpSpPr>
+      <p:grpSpPr>
+        <a:xfrm>
+          <a:off x="0" y="0"/>
+          <a:ext cx="0" cy="0"/>
+          <a:chOff x="0" y="0"/>
+          <a:chExt cx="0" cy="0"/>
+        </a:xfrm>
+      </p:grpSpPr>
+      <p:sp>
+        <p:nvSpPr>
+          <p:cNvPr id="2" name="Marcador de imagen de diapositiva 1"/>
+          <p:cNvSpPr>
+            <a:spLocks noGrp="1" noRot="1" noChangeAspect="1"/>
+          </p:cNvSpPr>
+          <p:nvPr>
+            <p:ph type="sldImg"/>
+          </p:nvPr>
+        </p:nvSpPr>
+        <p:spPr/>
+      </p:sp>
+      <p:sp>
+        <p:nvSpPr>
+          <p:cNvPr id="3" name="Marcador de notas 2"/>
+          <p:cNvSpPr>
+            <a:spLocks noGrp="1"/>
+          </p:cNvSpPr>
+          <p:nvPr>
+            <p:ph type="body" idx="1"/>
+          </p:nvPr>
+        </p:nvSpPr>
+        <p:spPr/>
+        <p:txBody>
+          <a:bodyPr/>
+          <a:lstStyle/>
+          <a:p>
+            <a:pPr algn="just">
+              <a:lnSpc>
+                <a:spcPct val="107000"/>
+              </a:lnSpc>
+              <a:spcAft>
+                <a:spcPts val="800"/>
+              </a:spcAft>
+              <a:buNone/>
+            </a:pPr>
+            <a:r>
+              <a:rPr lang="es-ES" sz="1800" kern="100" dirty="0">
+                <a:effectLst/>
+                <a:latin typeface="Aptos" panose="020B0004020202020204" pitchFamily="34" charset="0"/>
+                <a:ea typeface="Aptos" panose="020B0004020202020204" pitchFamily="34" charset="0"/>
+                <a:cs typeface="Times New Roman" panose="02020603050405020304" pitchFamily="18" charset="0"/>
+              </a:rPr>
+              <a:t>El objetivo de este estudio es explorar la situación de las enfermedades raras en Europa y España a partir de datos públicos con el fin de identificar patrones epidemiológicos, genéticos y clínicos relevantes para su investigación y gestión sanitaria.</a:t>
+            </a:r>
+          </a:p>
+          <a:p>
+            <a:pPr algn="just">
+              <a:lnSpc>
+                <a:spcPct val="107000"/>
+              </a:lnSpc>
+              <a:spcAft>
+                <a:spcPts val="800"/>
+              </a:spcAft>
+            </a:pPr>
+            <a:r>
+              <a:rPr lang="es-ES" sz="1800" kern="100" dirty="0">
+                <a:effectLst/>
+                <a:latin typeface="Aptos" panose="020B0004020202020204" pitchFamily="34" charset="0"/>
+                <a:ea typeface="Aptos" panose="020B0004020202020204" pitchFamily="34" charset="0"/>
+                <a:cs typeface="Times New Roman" panose="02020603050405020304" pitchFamily="18" charset="0"/>
+              </a:rPr>
+              <a:t>Se plantean varias hipótesis y preguntas de investigación en torno a las enfermedades raras. Por un lado, se parte de la idea de que las enfermedades con mayor número de fenotipos suelen estar mejor caracterizadas clínicamente, aunque esto no implica necesariamente una mayor prevalencia. También se busca identificar qué clases de enfermedades presentan una mayor diversidad genética. Finalmente, se analiza qué regiones de España muestran una mayor carga de enfermedades raras según los informes del ReeR, y si existe una concentración más alta de diagnósticos en las comunidades autónomas con mayor población.</a:t>
+            </a:r>
+          </a:p>
+          <a:p>
+            <a:endParaRPr lang="es-ES" dirty="0"/>
+          </a:p>
+        </p:txBody>
+      </p:sp>
+      <p:sp>
+        <p:nvSpPr>
+          <p:cNvPr id="4" name="Marcador de número de diapositiva 3"/>
+          <p:cNvSpPr>
+            <a:spLocks noGrp="1"/>
+          </p:cNvSpPr>
+          <p:nvPr>
+            <p:ph type="sldNum" sz="quarter" idx="5"/>
+          </p:nvPr>
+        </p:nvSpPr>
+        <p:spPr/>
+        <p:txBody>
+          <a:bodyPr/>
+          <a:lstStyle/>
+          <a:p>
+            <a:fld id="{C5AD6287-8F06-4BF2-AC90-69C9A69868BD}" type="slidenum">
+              <a:rPr lang="es-ES" smtClean="0"/>
+              <a:t>4</a:t>
+            </a:fld>
+            <a:endParaRPr lang="es-ES"/>
+          </a:p>
+        </p:txBody>
+      </p:sp>
+    </p:spTree>
+    <p:extLst>
+      <p:ext uri="{BB962C8B-B14F-4D97-AF65-F5344CB8AC3E}">
+        <p14:creationId xmlns:p14="http://schemas.microsoft.com/office/powerpoint/2010/main" val="260631999"/>
+      </p:ext>
+    </p:extLst>
+  </p:cSld>
+  <p:clrMapOvr>
+    <a:masterClrMapping/>
+  </p:clrMapOvr>
+</p:notes>
+</file>
+
 <file path=ppt/slideLayouts/slideLayout1.xml><?xml version="1.0" encoding="utf-8"?>
 <p:sldLayout xmlns:a="http://schemas.openxmlformats.org/drawingml/2006/main" xmlns:r="http://schemas.openxmlformats.org/officeDocument/2006/relationships" xmlns:p="http://schemas.openxmlformats.org/presentationml/2006/main" type="title" preserve="1">
   <p:cSld name="Title Slide">
@@ -23944,10 +24067,10 @@
             </a:pathLst>
           </a:custGeom>
           <a:blipFill>
-            <a:blip r:embed="rId2">
+            <a:blip r:embed="rId3">
               <a:extLst>
                 <a:ext uri="{96DAC541-7B7A-43D3-8B79-37D633B846F1}">
-                  <asvg:svgBlip xmlns:asvg="http://schemas.microsoft.com/office/drawing/2016/SVG/main" r:embed="rId3"/>
+                  <asvg:svgBlip xmlns:asvg="http://schemas.microsoft.com/office/drawing/2016/SVG/main" r:embed="rId4"/>
                 </a:ext>
               </a:extLst>
             </a:blip>
@@ -24003,10 +24126,10 @@
             </a:pathLst>
           </a:custGeom>
           <a:blipFill>
-            <a:blip r:embed="rId2">
+            <a:blip r:embed="rId3">
               <a:extLst>
                 <a:ext uri="{96DAC541-7B7A-43D3-8B79-37D633B846F1}">
-                  <asvg:svgBlip xmlns:asvg="http://schemas.microsoft.com/office/drawing/2016/SVG/main" r:embed="rId3"/>
+                  <asvg:svgBlip xmlns:asvg="http://schemas.microsoft.com/office/drawing/2016/SVG/main" r:embed="rId4"/>
                 </a:ext>
               </a:extLst>
             </a:blip>
@@ -24395,10 +24518,10 @@
             </a:pathLst>
           </a:custGeom>
           <a:blipFill>
-            <a:blip r:embed="rId4">
+            <a:blip r:embed="rId5">
               <a:extLst>
                 <a:ext uri="{96DAC541-7B7A-43D3-8B79-37D633B846F1}">
-                  <asvg:svgBlip xmlns:asvg="http://schemas.microsoft.com/office/drawing/2016/SVG/main" r:embed="rId5"/>
+                  <asvg:svgBlip xmlns:asvg="http://schemas.microsoft.com/office/drawing/2016/SVG/main" r:embed="rId6"/>
                 </a:ext>
               </a:extLst>
             </a:blip>
@@ -24454,10 +24577,10 @@
             </a:pathLst>
           </a:custGeom>
           <a:blipFill>
-            <a:blip r:embed="rId6">
+            <a:blip r:embed="rId7">
               <a:extLst>
                 <a:ext uri="{96DAC541-7B7A-43D3-8B79-37D633B846F1}">
-                  <asvg:svgBlip xmlns:asvg="http://schemas.microsoft.com/office/drawing/2016/SVG/main" r:embed="rId7"/>
+                  <asvg:svgBlip xmlns:asvg="http://schemas.microsoft.com/office/drawing/2016/SVG/main" r:embed="rId8"/>
                 </a:ext>
               </a:extLst>
             </a:blip>
@@ -24513,10 +24636,10 @@
             </a:pathLst>
           </a:custGeom>
           <a:blipFill>
-            <a:blip r:embed="rId8">
+            <a:blip r:embed="rId9">
               <a:extLst>
                 <a:ext uri="{96DAC541-7B7A-43D3-8B79-37D633B846F1}">
-                  <asvg:svgBlip xmlns:asvg="http://schemas.microsoft.com/office/drawing/2016/SVG/main" r:embed="rId9"/>
+                  <asvg:svgBlip xmlns:asvg="http://schemas.microsoft.com/office/drawing/2016/SVG/main" r:embed="rId10"/>
                 </a:ext>
               </a:extLst>
             </a:blip>
@@ -24572,10 +24695,10 @@
             </a:pathLst>
           </a:custGeom>
           <a:blipFill>
-            <a:blip r:embed="rId10">
+            <a:blip r:embed="rId11">
               <a:extLst>
                 <a:ext uri="{96DAC541-7B7A-43D3-8B79-37D633B846F1}">
-                  <asvg:svgBlip xmlns:asvg="http://schemas.microsoft.com/office/drawing/2016/SVG/main" r:embed="rId11"/>
+                  <asvg:svgBlip xmlns:asvg="http://schemas.microsoft.com/office/drawing/2016/SVG/main" r:embed="rId12"/>
                 </a:ext>
               </a:extLst>
             </a:blip>

</xml_diff>